<commit_message>
remove -zi in name
</commit_message>
<xml_diff>
--- a/Finger Recognition by TensorFlow Models on Android.pptx
+++ b/Finger Recognition by TensorFlow Models on Android.pptx
@@ -3542,7 +3542,7 @@
                 <a:ea typeface="Consolas" charset="0"/>
                 <a:cs typeface="Consolas" charset="0"/>
               </a:rPr>
-              <a:t>RecognizationActivity.java</a:t>
+              <a:t>RecognitionActivity.java</a:t>
             </a:r>
           </a:p>
           <a:p>
@@ -3559,7 +3559,23 @@
                 <a:ea typeface="Consolas" charset="0"/>
                 <a:cs typeface="Consolas" charset="0"/>
               </a:rPr>
-              <a:t>activity_recognization.xml</a:t>
+              <a:t>activity</a:t>
+            </a:r>
+            <a:r>
+              <a:rPr lang="en-US" sz="1200">
+                <a:latin typeface="Consolas" charset="0"/>
+                <a:ea typeface="Consolas" charset="0"/>
+                <a:cs typeface="Consolas" charset="0"/>
+              </a:rPr>
+              <a:t>_recognition</a:t>
+            </a:r>
+            <a:r>
+              <a:rPr lang="en-US" sz="1200" dirty="0">
+                <a:latin typeface="Consolas" charset="0"/>
+                <a:ea typeface="Consolas" charset="0"/>
+                <a:cs typeface="Consolas" charset="0"/>
+              </a:rPr>
+              <a:t>.xml</a:t>
             </a:r>
           </a:p>
         </p:txBody>

</xml_diff>